<commit_message>
cleaned soem data manually and tidied code
</commit_message>
<xml_diff>
--- a/figures/for_paper/Conceptual_diagram.pptx
+++ b/figures/for_paper/Conceptual_diagram.pptx
@@ -272,7 +272,7 @@
           <a:p>
             <a:fld id="{25CA2FA6-CA3C-4105-B931-5909622829FA}" type="datetimeFigureOut">
               <a:rPr lang="en-GB" smtClean="0"/>
-              <a:t>07/06/2023</a:t>
+              <a:t>19/06/2023</a:t>
             </a:fld>
             <a:endParaRPr lang="en-GB"/>
           </a:p>
@@ -472,7 +472,7 @@
           <a:p>
             <a:fld id="{25CA2FA6-CA3C-4105-B931-5909622829FA}" type="datetimeFigureOut">
               <a:rPr lang="en-GB" smtClean="0"/>
-              <a:t>07/06/2023</a:t>
+              <a:t>19/06/2023</a:t>
             </a:fld>
             <a:endParaRPr lang="en-GB"/>
           </a:p>
@@ -682,7 +682,7 @@
           <a:p>
             <a:fld id="{25CA2FA6-CA3C-4105-B931-5909622829FA}" type="datetimeFigureOut">
               <a:rPr lang="en-GB" smtClean="0"/>
-              <a:t>07/06/2023</a:t>
+              <a:t>19/06/2023</a:t>
             </a:fld>
             <a:endParaRPr lang="en-GB"/>
           </a:p>
@@ -882,7 +882,7 @@
           <a:p>
             <a:fld id="{25CA2FA6-CA3C-4105-B931-5909622829FA}" type="datetimeFigureOut">
               <a:rPr lang="en-GB" smtClean="0"/>
-              <a:t>07/06/2023</a:t>
+              <a:t>19/06/2023</a:t>
             </a:fld>
             <a:endParaRPr lang="en-GB"/>
           </a:p>
@@ -1158,7 +1158,7 @@
           <a:p>
             <a:fld id="{25CA2FA6-CA3C-4105-B931-5909622829FA}" type="datetimeFigureOut">
               <a:rPr lang="en-GB" smtClean="0"/>
-              <a:t>07/06/2023</a:t>
+              <a:t>19/06/2023</a:t>
             </a:fld>
             <a:endParaRPr lang="en-GB"/>
           </a:p>
@@ -1426,7 +1426,7 @@
           <a:p>
             <a:fld id="{25CA2FA6-CA3C-4105-B931-5909622829FA}" type="datetimeFigureOut">
               <a:rPr lang="en-GB" smtClean="0"/>
-              <a:t>07/06/2023</a:t>
+              <a:t>19/06/2023</a:t>
             </a:fld>
             <a:endParaRPr lang="en-GB"/>
           </a:p>
@@ -1841,7 +1841,7 @@
           <a:p>
             <a:fld id="{25CA2FA6-CA3C-4105-B931-5909622829FA}" type="datetimeFigureOut">
               <a:rPr lang="en-GB" smtClean="0"/>
-              <a:t>07/06/2023</a:t>
+              <a:t>19/06/2023</a:t>
             </a:fld>
             <a:endParaRPr lang="en-GB"/>
           </a:p>
@@ -1983,7 +1983,7 @@
           <a:p>
             <a:fld id="{25CA2FA6-CA3C-4105-B931-5909622829FA}" type="datetimeFigureOut">
               <a:rPr lang="en-GB" smtClean="0"/>
-              <a:t>07/06/2023</a:t>
+              <a:t>19/06/2023</a:t>
             </a:fld>
             <a:endParaRPr lang="en-GB"/>
           </a:p>
@@ -2096,7 +2096,7 @@
           <a:p>
             <a:fld id="{25CA2FA6-CA3C-4105-B931-5909622829FA}" type="datetimeFigureOut">
               <a:rPr lang="en-GB" smtClean="0"/>
-              <a:t>07/06/2023</a:t>
+              <a:t>19/06/2023</a:t>
             </a:fld>
             <a:endParaRPr lang="en-GB"/>
           </a:p>
@@ -2409,7 +2409,7 @@
           <a:p>
             <a:fld id="{25CA2FA6-CA3C-4105-B931-5909622829FA}" type="datetimeFigureOut">
               <a:rPr lang="en-GB" smtClean="0"/>
-              <a:t>07/06/2023</a:t>
+              <a:t>19/06/2023</a:t>
             </a:fld>
             <a:endParaRPr lang="en-GB"/>
           </a:p>
@@ -2698,7 +2698,7 @@
           <a:p>
             <a:fld id="{25CA2FA6-CA3C-4105-B931-5909622829FA}" type="datetimeFigureOut">
               <a:rPr lang="en-GB" smtClean="0"/>
-              <a:t>07/06/2023</a:t>
+              <a:t>19/06/2023</a:t>
             </a:fld>
             <a:endParaRPr lang="en-GB"/>
           </a:p>
@@ -2941,7 +2941,7 @@
           <a:p>
             <a:fld id="{25CA2FA6-CA3C-4105-B931-5909622829FA}" type="datetimeFigureOut">
               <a:rPr lang="en-GB" smtClean="0"/>
-              <a:t>07/06/2023</a:t>
+              <a:t>19/06/2023</a:t>
             </a:fld>
             <a:endParaRPr lang="en-GB"/>
           </a:p>
@@ -4060,6 +4060,55 @@
           </a:p>
         </p:txBody>
       </p:sp>
+      <p:sp>
+        <p:nvSpPr>
+          <p:cNvPr id="18" name="Rectangle: Rounded Corners 17">
+            <a:extLst>
+              <a:ext uri="{FF2B5EF4-FFF2-40B4-BE49-F238E27FC236}">
+                <a16:creationId xmlns:a16="http://schemas.microsoft.com/office/drawing/2014/main" id="{1B405AA9-F649-4AA5-8726-627E66D858C5}"/>
+              </a:ext>
+            </a:extLst>
+          </p:cNvPr>
+          <p:cNvSpPr/>
+          <p:nvPr/>
+        </p:nvSpPr>
+        <p:spPr>
+          <a:xfrm>
+            <a:off x="5279368" y="5749506"/>
+            <a:ext cx="1664898" cy="992038"/>
+          </a:xfrm>
+          <a:prstGeom prst="roundRect">
+            <a:avLst/>
+          </a:prstGeom>
+        </p:spPr>
+        <p:style>
+          <a:lnRef idx="2">
+            <a:schemeClr val="accent1">
+              <a:shade val="50000"/>
+            </a:schemeClr>
+          </a:lnRef>
+          <a:fillRef idx="1">
+            <a:schemeClr val="accent1"/>
+          </a:fillRef>
+          <a:effectRef idx="0">
+            <a:schemeClr val="accent1"/>
+          </a:effectRef>
+          <a:fontRef idx="minor">
+            <a:schemeClr val="lt1"/>
+          </a:fontRef>
+        </p:style>
+        <p:txBody>
+          <a:bodyPr rtlCol="0" anchor="ctr"/>
+          <a:lstStyle/>
+          <a:p>
+            <a:pPr algn="ctr"/>
+            <a:r>
+              <a:rPr lang="en-GB" dirty="0"/>
+              <a:t>Exoskeleton</a:t>
+            </a:r>
+          </a:p>
+        </p:txBody>
+      </p:sp>
     </p:spTree>
     <p:extLst>
       <p:ext uri="{BB962C8B-B14F-4D97-AF65-F5344CB8AC3E}">

</xml_diff>

<commit_message>
added a draft conceptual diagram
</commit_message>
<xml_diff>
--- a/figures/for_paper/Conceptual_diagram.pptx
+++ b/figures/for_paper/Conceptual_diagram.pptx
@@ -272,7 +272,7 @@
           <a:p>
             <a:fld id="{25CA2FA6-CA3C-4105-B931-5909622829FA}" type="datetimeFigureOut">
               <a:rPr lang="en-GB" smtClean="0"/>
-              <a:t>19/06/2023</a:t>
+              <a:t>31/07/2023</a:t>
             </a:fld>
             <a:endParaRPr lang="en-GB"/>
           </a:p>
@@ -472,7 +472,7 @@
           <a:p>
             <a:fld id="{25CA2FA6-CA3C-4105-B931-5909622829FA}" type="datetimeFigureOut">
               <a:rPr lang="en-GB" smtClean="0"/>
-              <a:t>19/06/2023</a:t>
+              <a:t>31/07/2023</a:t>
             </a:fld>
             <a:endParaRPr lang="en-GB"/>
           </a:p>
@@ -682,7 +682,7 @@
           <a:p>
             <a:fld id="{25CA2FA6-CA3C-4105-B931-5909622829FA}" type="datetimeFigureOut">
               <a:rPr lang="en-GB" smtClean="0"/>
-              <a:t>19/06/2023</a:t>
+              <a:t>31/07/2023</a:t>
             </a:fld>
             <a:endParaRPr lang="en-GB"/>
           </a:p>
@@ -882,7 +882,7 @@
           <a:p>
             <a:fld id="{25CA2FA6-CA3C-4105-B931-5909622829FA}" type="datetimeFigureOut">
               <a:rPr lang="en-GB" smtClean="0"/>
-              <a:t>19/06/2023</a:t>
+              <a:t>31/07/2023</a:t>
             </a:fld>
             <a:endParaRPr lang="en-GB"/>
           </a:p>
@@ -1158,7 +1158,7 @@
           <a:p>
             <a:fld id="{25CA2FA6-CA3C-4105-B931-5909622829FA}" type="datetimeFigureOut">
               <a:rPr lang="en-GB" smtClean="0"/>
-              <a:t>19/06/2023</a:t>
+              <a:t>31/07/2023</a:t>
             </a:fld>
             <a:endParaRPr lang="en-GB"/>
           </a:p>
@@ -1426,7 +1426,7 @@
           <a:p>
             <a:fld id="{25CA2FA6-CA3C-4105-B931-5909622829FA}" type="datetimeFigureOut">
               <a:rPr lang="en-GB" smtClean="0"/>
-              <a:t>19/06/2023</a:t>
+              <a:t>31/07/2023</a:t>
             </a:fld>
             <a:endParaRPr lang="en-GB"/>
           </a:p>
@@ -1841,7 +1841,7 @@
           <a:p>
             <a:fld id="{25CA2FA6-CA3C-4105-B931-5909622829FA}" type="datetimeFigureOut">
               <a:rPr lang="en-GB" smtClean="0"/>
-              <a:t>19/06/2023</a:t>
+              <a:t>31/07/2023</a:t>
             </a:fld>
             <a:endParaRPr lang="en-GB"/>
           </a:p>
@@ -1983,7 +1983,7 @@
           <a:p>
             <a:fld id="{25CA2FA6-CA3C-4105-B931-5909622829FA}" type="datetimeFigureOut">
               <a:rPr lang="en-GB" smtClean="0"/>
-              <a:t>19/06/2023</a:t>
+              <a:t>31/07/2023</a:t>
             </a:fld>
             <a:endParaRPr lang="en-GB"/>
           </a:p>
@@ -2096,7 +2096,7 @@
           <a:p>
             <a:fld id="{25CA2FA6-CA3C-4105-B931-5909622829FA}" type="datetimeFigureOut">
               <a:rPr lang="en-GB" smtClean="0"/>
-              <a:t>19/06/2023</a:t>
+              <a:t>31/07/2023</a:t>
             </a:fld>
             <a:endParaRPr lang="en-GB"/>
           </a:p>
@@ -2409,7 +2409,7 @@
           <a:p>
             <a:fld id="{25CA2FA6-CA3C-4105-B931-5909622829FA}" type="datetimeFigureOut">
               <a:rPr lang="en-GB" smtClean="0"/>
-              <a:t>19/06/2023</a:t>
+              <a:t>31/07/2023</a:t>
             </a:fld>
             <a:endParaRPr lang="en-GB"/>
           </a:p>
@@ -2698,7 +2698,7 @@
           <a:p>
             <a:fld id="{25CA2FA6-CA3C-4105-B931-5909622829FA}" type="datetimeFigureOut">
               <a:rPr lang="en-GB" smtClean="0"/>
-              <a:t>19/06/2023</a:t>
+              <a:t>31/07/2023</a:t>
             </a:fld>
             <a:endParaRPr lang="en-GB"/>
           </a:p>
@@ -2941,7 +2941,7 @@
           <a:p>
             <a:fld id="{25CA2FA6-CA3C-4105-B931-5909622829FA}" type="datetimeFigureOut">
               <a:rPr lang="en-GB" smtClean="0"/>
-              <a:t>19/06/2023</a:t>
+              <a:t>31/07/2023</a:t>
             </a:fld>
             <a:endParaRPr lang="en-GB"/>
           </a:p>
@@ -3499,10 +3499,10 @@
       </p:sp>
       <p:sp>
         <p:nvSpPr>
-          <p:cNvPr id="8" name="Rectangle: Rounded Corners 7">
-            <a:extLst>
-              <a:ext uri="{FF2B5EF4-FFF2-40B4-BE49-F238E27FC236}">
-                <a16:creationId xmlns:a16="http://schemas.microsoft.com/office/drawing/2014/main" id="{4389E688-105F-441B-BCC3-9B872D1636BD}"/>
+          <p:cNvPr id="9" name="Rectangle: Rounded Corners 8">
+            <a:extLst>
+              <a:ext uri="{FF2B5EF4-FFF2-40B4-BE49-F238E27FC236}">
+                <a16:creationId xmlns:a16="http://schemas.microsoft.com/office/drawing/2014/main" id="{840256C9-AF56-40EA-8099-06B270CACAFD}"/>
               </a:ext>
             </a:extLst>
           </p:cNvPr>
@@ -3511,7 +3511,7 @@
         </p:nvSpPr>
         <p:spPr>
           <a:xfrm>
-            <a:off x="5282243" y="756244"/>
+            <a:off x="5279368" y="631171"/>
             <a:ext cx="1664898" cy="992038"/>
           </a:xfrm>
           <a:prstGeom prst="roundRect">
@@ -3541,17 +3541,17 @@
             <a:pPr algn="ctr"/>
             <a:r>
               <a:rPr lang="en-GB" dirty="0"/>
-              <a:t>Underlying aridity</a:t>
-            </a:r>
-          </a:p>
-        </p:txBody>
-      </p:sp>
-      <p:sp>
-        <p:nvSpPr>
-          <p:cNvPr id="9" name="Rectangle: Rounded Corners 8">
-            <a:extLst>
-              <a:ext uri="{FF2B5EF4-FFF2-40B4-BE49-F238E27FC236}">
-                <a16:creationId xmlns:a16="http://schemas.microsoft.com/office/drawing/2014/main" id="{840256C9-AF56-40EA-8099-06B270CACAFD}"/>
+              <a:t>Litter vs soil</a:t>
+            </a:r>
+          </a:p>
+        </p:txBody>
+      </p:sp>
+      <p:sp>
+        <p:nvSpPr>
+          <p:cNvPr id="10" name="Rectangle: Rounded Corners 9">
+            <a:extLst>
+              <a:ext uri="{FF2B5EF4-FFF2-40B4-BE49-F238E27FC236}">
+                <a16:creationId xmlns:a16="http://schemas.microsoft.com/office/drawing/2014/main" id="{168DF619-B36E-457C-82CA-04412C8A5410}"/>
               </a:ext>
             </a:extLst>
           </p:cNvPr>
@@ -3590,55 +3590,6 @@
             <a:pPr algn="ctr"/>
             <a:r>
               <a:rPr lang="en-GB" dirty="0"/>
-              <a:t>Litter vs soil</a:t>
-            </a:r>
-          </a:p>
-        </p:txBody>
-      </p:sp>
-      <p:sp>
-        <p:nvSpPr>
-          <p:cNvPr id="10" name="Rectangle: Rounded Corners 9">
-            <a:extLst>
-              <a:ext uri="{FF2B5EF4-FFF2-40B4-BE49-F238E27FC236}">
-                <a16:creationId xmlns:a16="http://schemas.microsoft.com/office/drawing/2014/main" id="{168DF619-B36E-457C-82CA-04412C8A5410}"/>
-              </a:ext>
-            </a:extLst>
-          </p:cNvPr>
-          <p:cNvSpPr/>
-          <p:nvPr/>
-        </p:nvSpPr>
-        <p:spPr>
-          <a:xfrm>
-            <a:off x="5279368" y="4738772"/>
-            <a:ext cx="1664898" cy="992038"/>
-          </a:xfrm>
-          <a:prstGeom prst="roundRect">
-            <a:avLst/>
-          </a:prstGeom>
-        </p:spPr>
-        <p:style>
-          <a:lnRef idx="2">
-            <a:schemeClr val="accent1">
-              <a:shade val="50000"/>
-            </a:schemeClr>
-          </a:lnRef>
-          <a:fillRef idx="1">
-            <a:schemeClr val="accent1"/>
-          </a:fillRef>
-          <a:effectRef idx="0">
-            <a:schemeClr val="accent1"/>
-          </a:effectRef>
-          <a:fontRef idx="minor">
-            <a:schemeClr val="lt1"/>
-          </a:fontRef>
-        </p:style>
-        <p:txBody>
-          <a:bodyPr rtlCol="0" anchor="ctr"/>
-          <a:lstStyle/>
-          <a:p>
-            <a:pPr algn="ctr"/>
-            <a:r>
-              <a:rPr lang="en-GB" dirty="0"/>
               <a:t>Sizes</a:t>
             </a:r>
           </a:p>
@@ -3702,56 +3653,16 @@
               </a:ext>
             </a:extLst>
           </p:cNvPr>
-          <p:cNvCxnSpPr/>
-          <p:nvPr/>
-        </p:nvCxnSpPr>
-        <p:spPr>
-          <a:xfrm flipV="1">
-            <a:off x="4606506" y="3226275"/>
-            <a:ext cx="664234" cy="8626"/>
-          </a:xfrm>
-          <a:prstGeom prst="straightConnector1">
-            <a:avLst/>
-          </a:prstGeom>
-          <a:ln>
-            <a:tailEnd type="triangle"/>
-          </a:ln>
-        </p:spPr>
-        <p:style>
-          <a:lnRef idx="1">
-            <a:schemeClr val="accent1"/>
-          </a:lnRef>
-          <a:fillRef idx="0">
-            <a:schemeClr val="accent1"/>
-          </a:fillRef>
-          <a:effectRef idx="0">
-            <a:schemeClr val="accent1"/>
-          </a:effectRef>
-          <a:fontRef idx="minor">
-            <a:schemeClr val="tx1"/>
-          </a:fontRef>
-        </p:style>
-      </p:cxnSp>
-      <p:cxnSp>
-        <p:nvCxnSpPr>
-          <p:cNvPr id="13" name="Straight Arrow Connector 12">
-            <a:extLst>
-              <a:ext uri="{FF2B5EF4-FFF2-40B4-BE49-F238E27FC236}">
-                <a16:creationId xmlns:a16="http://schemas.microsoft.com/office/drawing/2014/main" id="{57D15015-E38D-4B59-A520-9EDFCE352586}"/>
-              </a:ext>
-            </a:extLst>
-          </p:cNvPr>
           <p:cNvCxnSpPr>
             <a:cxnSpLocks/>
-            <a:stCxn id="7" idx="3"/>
-            <a:endCxn id="8" idx="1"/>
+            <a:endCxn id="9" idx="1"/>
           </p:cNvCxnSpPr>
           <p:nvPr/>
         </p:nvCxnSpPr>
         <p:spPr>
           <a:xfrm flipV="1">
-            <a:off x="4606506" y="1252263"/>
-            <a:ext cx="675737" cy="1991264"/>
+            <a:off x="4606506" y="1127190"/>
+            <a:ext cx="672862" cy="2107712"/>
           </a:xfrm>
           <a:prstGeom prst="straightConnector1">
             <a:avLst/>
@@ -3794,7 +3705,7 @@
         <p:spPr>
           <a:xfrm>
             <a:off x="4606506" y="3243527"/>
-            <a:ext cx="672862" cy="1991264"/>
+            <a:ext cx="672862" cy="0"/>
           </a:xfrm>
           <a:prstGeom prst="straightConnector1">
             <a:avLst/>
@@ -4074,7 +3985,7 @@
         </p:nvSpPr>
         <p:spPr>
           <a:xfrm>
-            <a:off x="5279368" y="5749506"/>
+            <a:off x="5263551" y="4242753"/>
             <a:ext cx="1664898" cy="992038"/>
           </a:xfrm>
           <a:prstGeom prst="roundRect">
@@ -4109,6 +4020,49 @@
           </a:p>
         </p:txBody>
       </p:sp>
+      <p:cxnSp>
+        <p:nvCxnSpPr>
+          <p:cNvPr id="21" name="Straight Arrow Connector 20">
+            <a:extLst>
+              <a:ext uri="{FF2B5EF4-FFF2-40B4-BE49-F238E27FC236}">
+                <a16:creationId xmlns:a16="http://schemas.microsoft.com/office/drawing/2014/main" id="{4A24695B-770C-45A7-886F-1B04832244C7}"/>
+              </a:ext>
+            </a:extLst>
+          </p:cNvPr>
+          <p:cNvCxnSpPr>
+            <a:cxnSpLocks/>
+            <a:stCxn id="7" idx="3"/>
+            <a:endCxn id="18" idx="1"/>
+          </p:cNvCxnSpPr>
+          <p:nvPr/>
+        </p:nvCxnSpPr>
+        <p:spPr>
+          <a:xfrm>
+            <a:off x="4606506" y="3243527"/>
+            <a:ext cx="657045" cy="1495245"/>
+          </a:xfrm>
+          <a:prstGeom prst="straightConnector1">
+            <a:avLst/>
+          </a:prstGeom>
+          <a:ln>
+            <a:tailEnd type="triangle"/>
+          </a:ln>
+        </p:spPr>
+        <p:style>
+          <a:lnRef idx="1">
+            <a:schemeClr val="accent1"/>
+          </a:lnRef>
+          <a:fillRef idx="0">
+            <a:schemeClr val="accent1"/>
+          </a:fillRef>
+          <a:effectRef idx="0">
+            <a:schemeClr val="accent1"/>
+          </a:effectRef>
+          <a:fontRef idx="minor">
+            <a:schemeClr val="tx1"/>
+          </a:fontRef>
+        </p:style>
+      </p:cxnSp>
     </p:spTree>
     <p:extLst>
       <p:ext uri="{BB962C8B-B14F-4D97-AF65-F5344CB8AC3E}">

</xml_diff>